<commit_message>
added plots for mid presentation
</commit_message>
<xml_diff>
--- a/MidPresentation.pptx
+++ b/MidPresentation.pptx
@@ -10,14 +10,15 @@
     <p:sldId id="259" r:id="rId4"/>
     <p:sldId id="266" r:id="rId5"/>
     <p:sldId id="267" r:id="rId6"/>
-    <p:sldId id="268" r:id="rId7"/>
-    <p:sldId id="265" r:id="rId8"/>
-    <p:sldId id="258" r:id="rId9"/>
-    <p:sldId id="260" r:id="rId10"/>
-    <p:sldId id="261" r:id="rId11"/>
-    <p:sldId id="262" r:id="rId12"/>
-    <p:sldId id="263" r:id="rId13"/>
-    <p:sldId id="264" r:id="rId14"/>
+    <p:sldId id="265" r:id="rId7"/>
+    <p:sldId id="258" r:id="rId8"/>
+    <p:sldId id="260" r:id="rId9"/>
+    <p:sldId id="261" r:id="rId10"/>
+    <p:sldId id="262" r:id="rId11"/>
+    <p:sldId id="269" r:id="rId12"/>
+    <p:sldId id="270" r:id="rId13"/>
+    <p:sldId id="263" r:id="rId14"/>
+    <p:sldId id="264" r:id="rId15"/>
   </p:sldIdLst>
   <p:sldSz cx="12192000" cy="6858000"/>
   <p:notesSz cx="6858000" cy="9144000"/>
@@ -257,7 +258,7 @@
           <a:p>
             <a:fld id="{8F381E78-F699-4BB9-8B9C-17843E54B19D}" type="datetimeFigureOut">
               <a:rPr lang="en-US" smtClean="0"/>
-              <a:t>12/11/2017</a:t>
+              <a:t>12/24/2017</a:t>
             </a:fld>
             <a:endParaRPr lang="en-US"/>
           </a:p>
@@ -425,7 +426,7 @@
           <a:p>
             <a:fld id="{8F381E78-F699-4BB9-8B9C-17843E54B19D}" type="datetimeFigureOut">
               <a:rPr lang="en-US" smtClean="0"/>
-              <a:t>12/11/2017</a:t>
+              <a:t>12/24/2017</a:t>
             </a:fld>
             <a:endParaRPr lang="en-US"/>
           </a:p>
@@ -603,7 +604,7 @@
           <a:p>
             <a:fld id="{8F381E78-F699-4BB9-8B9C-17843E54B19D}" type="datetimeFigureOut">
               <a:rPr lang="en-US" smtClean="0"/>
-              <a:t>12/11/2017</a:t>
+              <a:t>12/24/2017</a:t>
             </a:fld>
             <a:endParaRPr lang="en-US"/>
           </a:p>
@@ -771,7 +772,7 @@
           <a:p>
             <a:fld id="{8F381E78-F699-4BB9-8B9C-17843E54B19D}" type="datetimeFigureOut">
               <a:rPr lang="en-US" smtClean="0"/>
-              <a:t>12/11/2017</a:t>
+              <a:t>12/24/2017</a:t>
             </a:fld>
             <a:endParaRPr lang="en-US"/>
           </a:p>
@@ -1016,7 +1017,7 @@
           <a:p>
             <a:fld id="{8F381E78-F699-4BB9-8B9C-17843E54B19D}" type="datetimeFigureOut">
               <a:rPr lang="en-US" smtClean="0"/>
-              <a:t>12/11/2017</a:t>
+              <a:t>12/24/2017</a:t>
             </a:fld>
             <a:endParaRPr lang="en-US"/>
           </a:p>
@@ -1245,7 +1246,7 @@
           <a:p>
             <a:fld id="{8F381E78-F699-4BB9-8B9C-17843E54B19D}" type="datetimeFigureOut">
               <a:rPr lang="en-US" smtClean="0"/>
-              <a:t>12/11/2017</a:t>
+              <a:t>12/24/2017</a:t>
             </a:fld>
             <a:endParaRPr lang="en-US"/>
           </a:p>
@@ -1609,7 +1610,7 @@
           <a:p>
             <a:fld id="{8F381E78-F699-4BB9-8B9C-17843E54B19D}" type="datetimeFigureOut">
               <a:rPr lang="en-US" smtClean="0"/>
-              <a:t>12/11/2017</a:t>
+              <a:t>12/24/2017</a:t>
             </a:fld>
             <a:endParaRPr lang="en-US"/>
           </a:p>
@@ -1726,7 +1727,7 @@
           <a:p>
             <a:fld id="{8F381E78-F699-4BB9-8B9C-17843E54B19D}" type="datetimeFigureOut">
               <a:rPr lang="en-US" smtClean="0"/>
-              <a:t>12/11/2017</a:t>
+              <a:t>12/24/2017</a:t>
             </a:fld>
             <a:endParaRPr lang="en-US"/>
           </a:p>
@@ -1821,7 +1822,7 @@
           <a:p>
             <a:fld id="{8F381E78-F699-4BB9-8B9C-17843E54B19D}" type="datetimeFigureOut">
               <a:rPr lang="en-US" smtClean="0"/>
-              <a:t>12/11/2017</a:t>
+              <a:t>12/24/2017</a:t>
             </a:fld>
             <a:endParaRPr lang="en-US"/>
           </a:p>
@@ -2096,7 +2097,7 @@
           <a:p>
             <a:fld id="{8F381E78-F699-4BB9-8B9C-17843E54B19D}" type="datetimeFigureOut">
               <a:rPr lang="en-US" smtClean="0"/>
-              <a:t>12/11/2017</a:t>
+              <a:t>12/24/2017</a:t>
             </a:fld>
             <a:endParaRPr lang="en-US"/>
           </a:p>
@@ -2348,7 +2349,7 @@
           <a:p>
             <a:fld id="{8F381E78-F699-4BB9-8B9C-17843E54B19D}" type="datetimeFigureOut">
               <a:rPr lang="en-US" smtClean="0"/>
-              <a:t>12/11/2017</a:t>
+              <a:t>12/24/2017</a:t>
             </a:fld>
             <a:endParaRPr lang="en-US"/>
           </a:p>
@@ -2559,7 +2560,7 @@
           <a:p>
             <a:fld id="{8F381E78-F699-4BB9-8B9C-17843E54B19D}" type="datetimeFigureOut">
               <a:rPr lang="en-US" smtClean="0"/>
-              <a:t>12/11/2017</a:t>
+              <a:t>12/24/2017</a:t>
             </a:fld>
             <a:endParaRPr lang="en-US"/>
           </a:p>
@@ -3077,290 +3078,15 @@
         </p:nvSpPr>
         <p:spPr/>
         <p:txBody>
-          <a:bodyPr>
-            <a:normAutofit/>
-          </a:bodyPr>
+          <a:bodyPr/>
           <a:lstStyle/>
           <a:p>
             <a:r>
               <a:rPr lang="en-US" dirty="0"/>
-              <a:t>Simulating data using a Tetrapod simulator – </a:t>
+              <a:t>Run ICA under different conditions and observe results – </a:t>
             </a:r>
             <a:r>
               <a:rPr lang="en-US" b="1" u="sng" dirty="0"/>
-              <a:t>done</a:t>
-            </a:r>
-          </a:p>
-          <a:p>
-            <a:r>
-              <a:rPr lang="en-US" dirty="0"/>
-              <a:t>For example:</a:t>
-            </a:r>
-          </a:p>
-          <a:p>
-            <a:endParaRPr lang="en-US" dirty="0"/>
-          </a:p>
-          <a:p>
-            <a:endParaRPr lang="en-US" dirty="0"/>
-          </a:p>
-          <a:p>
-            <a:endParaRPr lang="en-US" dirty="0"/>
-          </a:p>
-          <a:p>
-            <a:endParaRPr lang="en-US" dirty="0"/>
-          </a:p>
-        </p:txBody>
-      </p:sp>
-      <p:pic>
-        <p:nvPicPr>
-          <p:cNvPr id="5" name="BlinkMov">
-            <a:hlinkClick r:id="" action="ppaction://media"/>
-            <a:extLst>
-              <a:ext uri="{FF2B5EF4-FFF2-40B4-BE49-F238E27FC236}">
-                <a16:creationId xmlns:a16="http://schemas.microsoft.com/office/drawing/2014/main" id="{8D471403-6D72-469A-9A84-25B555BDAFE3}"/>
-              </a:ext>
-            </a:extLst>
-          </p:cNvPr>
-          <p:cNvPicPr>
-            <a:picLocks noChangeAspect="1"/>
-          </p:cNvPicPr>
-          <p:nvPr>
-            <a:videoFile r:link="rId2"/>
-            <p:extLst>
-              <p:ext uri="{DAA4B4D4-6D71-4841-9C94-3DE7FCFB9230}">
-                <p14:media xmlns:p14="http://schemas.microsoft.com/office/powerpoint/2010/main" r:embed="rId1"/>
-              </p:ext>
-            </p:extLst>
-          </p:nvPr>
-        </p:nvPicPr>
-        <p:blipFill>
-          <a:blip r:embed="rId4"/>
-          <a:stretch>
-            <a:fillRect/>
-          </a:stretch>
-        </p:blipFill>
-        <p:spPr>
-          <a:xfrm>
-            <a:off x="4619134" y="3349023"/>
-            <a:ext cx="2757612" cy="2757612"/>
-          </a:xfrm>
-          <a:prstGeom prst="rect">
-            <a:avLst/>
-          </a:prstGeom>
-        </p:spPr>
-      </p:pic>
-    </p:spTree>
-    <p:extLst>
-      <p:ext uri="{BB962C8B-B14F-4D97-AF65-F5344CB8AC3E}">
-        <p14:creationId xmlns:p14="http://schemas.microsoft.com/office/powerpoint/2010/main" val="4062309665"/>
-      </p:ext>
-    </p:extLst>
-  </p:cSld>
-  <p:clrMapOvr>
-    <a:masterClrMapping/>
-  </p:clrMapOvr>
-  <p:timing>
-    <p:tnLst>
-      <p:par>
-        <p:cTn id="1" dur="indefinite" restart="never" nodeType="tmRoot">
-          <p:childTnLst>
-            <p:seq concurrent="1" nextAc="seek">
-              <p:cTn id="2" dur="indefinite" nodeType="mainSeq">
-                <p:childTnLst>
-                  <p:par>
-                    <p:cTn id="3" fill="hold">
-                      <p:stCondLst>
-                        <p:cond delay="indefinite"/>
-                      </p:stCondLst>
-                      <p:childTnLst>
-                        <p:par>
-                          <p:cTn id="4" fill="hold">
-                            <p:stCondLst>
-                              <p:cond delay="0"/>
-                            </p:stCondLst>
-                            <p:childTnLst>
-                              <p:par>
-                                <p:cTn id="5" presetID="1" presetClass="mediacall" presetSubtype="0" fill="hold" nodeType="clickEffect">
-                                  <p:stCondLst>
-                                    <p:cond delay="0"/>
-                                  </p:stCondLst>
-                                  <p:childTnLst>
-                                    <p:cmd type="call" cmd="playFrom(0.0)">
-                                      <p:cBhvr>
-                                        <p:cTn id="6" dur="1333" fill="hold"/>
-                                        <p:tgtEl>
-                                          <p:spTgt spid="5"/>
-                                        </p:tgtEl>
-                                      </p:cBhvr>
-                                    </p:cmd>
-                                  </p:childTnLst>
-                                </p:cTn>
-                              </p:par>
-                            </p:childTnLst>
-                          </p:cTn>
-                        </p:par>
-                      </p:childTnLst>
-                    </p:cTn>
-                  </p:par>
-                </p:childTnLst>
-              </p:cTn>
-              <p:prevCondLst>
-                <p:cond evt="onPrev" delay="0">
-                  <p:tgtEl>
-                    <p:sldTgt/>
-                  </p:tgtEl>
-                </p:cond>
-              </p:prevCondLst>
-              <p:nextCondLst>
-                <p:cond evt="onNext" delay="0">
-                  <p:tgtEl>
-                    <p:sldTgt/>
-                  </p:tgtEl>
-                </p:cond>
-              </p:nextCondLst>
-            </p:seq>
-            <p:video>
-              <p:cMediaNode vol="80000">
-                <p:cTn id="7" fill="hold" display="0">
-                  <p:stCondLst>
-                    <p:cond delay="indefinite"/>
-                  </p:stCondLst>
-                </p:cTn>
-                <p:tgtEl>
-                  <p:spTgt spid="5"/>
-                </p:tgtEl>
-              </p:cMediaNode>
-            </p:video>
-            <p:seq concurrent="1" nextAc="seek">
-              <p:cTn id="8" restart="whenNotActive" fill="hold" evtFilter="cancelBubble" nodeType="interactiveSeq">
-                <p:stCondLst>
-                  <p:cond evt="onClick" delay="0">
-                    <p:tgtEl>
-                      <p:spTgt spid="5"/>
-                    </p:tgtEl>
-                  </p:cond>
-                </p:stCondLst>
-                <p:endSync evt="end" delay="0">
-                  <p:rtn val="all"/>
-                </p:endSync>
-                <p:childTnLst>
-                  <p:par>
-                    <p:cTn id="9" fill="hold">
-                      <p:stCondLst>
-                        <p:cond delay="0"/>
-                      </p:stCondLst>
-                      <p:childTnLst>
-                        <p:par>
-                          <p:cTn id="10" fill="hold">
-                            <p:stCondLst>
-                              <p:cond delay="0"/>
-                            </p:stCondLst>
-                            <p:childTnLst>
-                              <p:par>
-                                <p:cTn id="11" presetID="2" presetClass="mediacall" presetSubtype="0" fill="hold" nodeType="clickEffect">
-                                  <p:stCondLst>
-                                    <p:cond delay="0"/>
-                                  </p:stCondLst>
-                                  <p:childTnLst>
-                                    <p:cmd type="call" cmd="togglePause">
-                                      <p:cBhvr>
-                                        <p:cTn id="12" dur="1" fill="hold"/>
-                                        <p:tgtEl>
-                                          <p:spTgt spid="5"/>
-                                        </p:tgtEl>
-                                      </p:cBhvr>
-                                    </p:cmd>
-                                  </p:childTnLst>
-                                </p:cTn>
-                              </p:par>
-                            </p:childTnLst>
-                          </p:cTn>
-                        </p:par>
-                      </p:childTnLst>
-                    </p:cTn>
-                  </p:par>
-                </p:childTnLst>
-              </p:cTn>
-              <p:nextCondLst>
-                <p:cond evt="onClick" delay="0">
-                  <p:tgtEl>
-                    <p:spTgt spid="5"/>
-                  </p:tgtEl>
-                </p:cond>
-              </p:nextCondLst>
-            </p:seq>
-          </p:childTnLst>
-        </p:cTn>
-      </p:par>
-    </p:tnLst>
-  </p:timing>
-</p:sld>
-</file>
-
-<file path=ppt/slides/slide11.xml><?xml version="1.0" encoding="utf-8"?>
-<p:sld xmlns:a="http://schemas.openxmlformats.org/drawingml/2006/main" xmlns:r="http://schemas.openxmlformats.org/officeDocument/2006/relationships" xmlns:p="http://schemas.openxmlformats.org/presentationml/2006/main">
-  <p:cSld>
-    <p:spTree>
-      <p:nvGrpSpPr>
-        <p:cNvPr id="1" name=""/>
-        <p:cNvGrpSpPr/>
-        <p:nvPr/>
-      </p:nvGrpSpPr>
-      <p:grpSpPr>
-        <a:xfrm>
-          <a:off x="0" y="0"/>
-          <a:ext cx="0" cy="0"/>
-          <a:chOff x="0" y="0"/>
-          <a:chExt cx="0" cy="0"/>
-        </a:xfrm>
-      </p:grpSpPr>
-      <p:sp>
-        <p:nvSpPr>
-          <p:cNvPr id="2" name="Title 1"/>
-          <p:cNvSpPr>
-            <a:spLocks noGrp="1"/>
-          </p:cNvSpPr>
-          <p:nvPr>
-            <p:ph type="title"/>
-          </p:nvPr>
-        </p:nvSpPr>
-        <p:spPr/>
-        <p:txBody>
-          <a:bodyPr/>
-          <a:lstStyle/>
-          <a:p>
-            <a:r>
-              <a:rPr lang="en-US" dirty="0"/>
-              <a:t>So far</a:t>
-            </a:r>
-          </a:p>
-        </p:txBody>
-      </p:sp>
-      <p:sp>
-        <p:nvSpPr>
-          <p:cNvPr id="3" name="Content Placeholder 2"/>
-          <p:cNvSpPr>
-            <a:spLocks noGrp="1"/>
-          </p:cNvSpPr>
-          <p:nvPr>
-            <p:ph idx="1"/>
-          </p:nvPr>
-        </p:nvSpPr>
-        <p:spPr/>
-        <p:txBody>
-          <a:bodyPr/>
-          <a:lstStyle/>
-          <a:p>
-            <a:r>
-              <a:rPr lang="en-US" dirty="0"/>
-              <a:t>Run ICA under different conditions and observe results </a:t>
-            </a:r>
-            <a:r>
-              <a:rPr lang="en-US" dirty="0" smtClean="0"/>
-              <a:t>– </a:t>
-            </a:r>
-            <a:r>
-              <a:rPr lang="en-US" b="1" u="sng" dirty="0" smtClean="0"/>
               <a:t>done</a:t>
             </a:r>
           </a:p>
@@ -3669,13 +3395,508 @@
   <p:clrMapOvr>
     <a:masterClrMapping/>
   </p:clrMapOvr>
-  <p:timing>
-    <p:tnLst>
-      <p:par>
-        <p:cTn id="1" dur="indefinite" restart="never" nodeType="tmRoot"/>
-      </p:par>
-    </p:tnLst>
-  </p:timing>
+</p:sld>
+</file>
+
+<file path=ppt/slides/slide11.xml><?xml version="1.0" encoding="utf-8"?>
+<p:sld xmlns:a="http://schemas.openxmlformats.org/drawingml/2006/main" xmlns:r="http://schemas.openxmlformats.org/officeDocument/2006/relationships" xmlns:p="http://schemas.openxmlformats.org/presentationml/2006/main">
+  <p:cSld>
+    <p:spTree>
+      <p:nvGrpSpPr>
+        <p:cNvPr id="1" name=""/>
+        <p:cNvGrpSpPr/>
+        <p:nvPr/>
+      </p:nvGrpSpPr>
+      <p:grpSpPr>
+        <a:xfrm>
+          <a:off x="0" y="0"/>
+          <a:ext cx="0" cy="0"/>
+          <a:chOff x="0" y="0"/>
+          <a:chExt cx="0" cy="0"/>
+        </a:xfrm>
+      </p:grpSpPr>
+      <p:sp>
+        <p:nvSpPr>
+          <p:cNvPr id="2" name="Title 1">
+            <a:extLst>
+              <a:ext uri="{FF2B5EF4-FFF2-40B4-BE49-F238E27FC236}">
+                <a16:creationId xmlns:a16="http://schemas.microsoft.com/office/drawing/2014/main" id="{067CF5E8-036C-49B9-A5C0-25BEEDB6249C}"/>
+              </a:ext>
+            </a:extLst>
+          </p:cNvPr>
+          <p:cNvSpPr>
+            <a:spLocks noGrp="1"/>
+          </p:cNvSpPr>
+          <p:nvPr>
+            <p:ph type="title"/>
+          </p:nvPr>
+        </p:nvSpPr>
+        <p:spPr/>
+        <p:txBody>
+          <a:bodyPr/>
+          <a:lstStyle/>
+          <a:p>
+            <a:pPr algn="ctr"/>
+            <a:r>
+              <a:rPr lang="en-US" dirty="0"/>
+              <a:t>ICA Performance Demonstration</a:t>
+            </a:r>
+          </a:p>
+        </p:txBody>
+      </p:sp>
+      <mc:AlternateContent xmlns:mc="http://schemas.openxmlformats.org/markup-compatibility/2006">
+        <mc:Choice xmlns:a14="http://schemas.microsoft.com/office/drawing/2010/main" Requires="a14">
+          <p:sp>
+            <p:nvSpPr>
+              <p:cNvPr id="3" name="Content Placeholder 2">
+                <a:extLst>
+                  <a:ext uri="{FF2B5EF4-FFF2-40B4-BE49-F238E27FC236}">
+                    <a16:creationId xmlns:a16="http://schemas.microsoft.com/office/drawing/2014/main" id="{C0565C77-94DE-4CBF-9792-C08EB5C2779C}"/>
+                  </a:ext>
+                </a:extLst>
+              </p:cNvPr>
+              <p:cNvSpPr>
+                <a:spLocks noGrp="1"/>
+              </p:cNvSpPr>
+              <p:nvPr>
+                <p:ph idx="1"/>
+              </p:nvPr>
+            </p:nvSpPr>
+            <p:spPr/>
+            <p:txBody>
+              <a:bodyPr/>
+              <a:lstStyle/>
+              <a:p>
+                <a:r>
+                  <a:rPr lang="en-US" dirty="0"/>
+                  <a:t>Criterion: Normalized Cross Correlation</a:t>
+                </a:r>
+              </a:p>
+              <a:p>
+                <a:endParaRPr lang="en-US" dirty="0"/>
+              </a:p>
+              <a:p>
+                <a:pPr marL="0" indent="0">
+                  <a:buNone/>
+                </a:pPr>
+                <a14:m>
+                  <m:oMathPara xmlns:m="http://schemas.openxmlformats.org/officeDocument/2006/math">
+                    <m:oMathParaPr>
+                      <m:jc m:val="centerGroup"/>
+                    </m:oMathParaPr>
+                    <m:oMath xmlns:m="http://schemas.openxmlformats.org/officeDocument/2006/math">
+                      <m:r>
+                        <a:rPr lang="en-US" b="0" i="1" smtClean="0">
+                          <a:latin typeface="Cambria Math" panose="02040503050406030204" pitchFamily="18" charset="0"/>
+                        </a:rPr>
+                        <m:t>𝐶</m:t>
+                      </m:r>
+                      <m:d>
+                        <m:dPr>
+                          <m:begChr m:val="["/>
+                          <m:endChr m:val="]"/>
+                          <m:ctrlPr>
+                            <a:rPr lang="en-US" b="0" i="1" smtClean="0">
+                              <a:latin typeface="Cambria Math" panose="02040503050406030204" pitchFamily="18" charset="0"/>
+                            </a:rPr>
+                          </m:ctrlPr>
+                        </m:dPr>
+                        <m:e>
+                          <m:r>
+                            <a:rPr lang="en-US" b="0" i="1" smtClean="0">
+                              <a:latin typeface="Cambria Math" panose="02040503050406030204" pitchFamily="18" charset="0"/>
+                            </a:rPr>
+                            <m:t>𝑘</m:t>
+                          </m:r>
+                          <m:r>
+                            <a:rPr lang="en-US" b="0" i="1" smtClean="0">
+                              <a:latin typeface="Cambria Math" panose="02040503050406030204" pitchFamily="18" charset="0"/>
+                            </a:rPr>
+                            <m:t>,</m:t>
+                          </m:r>
+                          <m:r>
+                            <a:rPr lang="en-US" b="0" i="1" smtClean="0">
+                              <a:latin typeface="Cambria Math" panose="02040503050406030204" pitchFamily="18" charset="0"/>
+                            </a:rPr>
+                            <m:t>𝑙</m:t>
+                          </m:r>
+                        </m:e>
+                      </m:d>
+                      <m:r>
+                        <a:rPr lang="en-US" b="0" i="1" smtClean="0">
+                          <a:latin typeface="Cambria Math" panose="02040503050406030204" pitchFamily="18" charset="0"/>
+                        </a:rPr>
+                        <m:t>=</m:t>
+                      </m:r>
+                      <m:f>
+                        <m:fPr>
+                          <m:ctrlPr>
+                            <a:rPr lang="en-US" b="0" i="1" smtClean="0">
+                              <a:latin typeface="Cambria Math" panose="02040503050406030204" pitchFamily="18" charset="0"/>
+                            </a:rPr>
+                          </m:ctrlPr>
+                        </m:fPr>
+                        <m:num>
+                          <m:r>
+                            <a:rPr lang="en-US" b="0" i="1" smtClean="0">
+                              <a:latin typeface="Cambria Math" panose="02040503050406030204" pitchFamily="18" charset="0"/>
+                            </a:rPr>
+                            <m:t>1</m:t>
+                          </m:r>
+                        </m:num>
+                        <m:den>
+                          <m:sSub>
+                            <m:sSubPr>
+                              <m:ctrlPr>
+                                <a:rPr lang="en-US" b="0" i="1" smtClean="0">
+                                  <a:latin typeface="Cambria Math" panose="02040503050406030204" pitchFamily="18" charset="0"/>
+                                </a:rPr>
+                              </m:ctrlPr>
+                            </m:sSubPr>
+                            <m:e>
+                              <m:r>
+                                <a:rPr lang="en-US" b="0" i="1" smtClean="0">
+                                  <a:latin typeface="Cambria Math" panose="02040503050406030204" pitchFamily="18" charset="0"/>
+                                  <a:ea typeface="Cambria Math" panose="02040503050406030204" pitchFamily="18" charset="0"/>
+                                </a:rPr>
+                                <m:t>𝜎</m:t>
+                              </m:r>
+                            </m:e>
+                            <m:sub>
+                              <m:r>
+                                <a:rPr lang="en-US" b="0" i="1" smtClean="0">
+                                  <a:latin typeface="Cambria Math" panose="02040503050406030204" pitchFamily="18" charset="0"/>
+                                </a:rPr>
+                                <m:t>𝑋</m:t>
+                              </m:r>
+                            </m:sub>
+                          </m:sSub>
+                          <m:sSub>
+                            <m:sSubPr>
+                              <m:ctrlPr>
+                                <a:rPr lang="en-US" b="0" i="1" smtClean="0">
+                                  <a:latin typeface="Cambria Math" panose="02040503050406030204" pitchFamily="18" charset="0"/>
+                                </a:rPr>
+                              </m:ctrlPr>
+                            </m:sSubPr>
+                            <m:e>
+                              <m:r>
+                                <a:rPr lang="en-US" b="0" i="1" smtClean="0">
+                                  <a:latin typeface="Cambria Math" panose="02040503050406030204" pitchFamily="18" charset="0"/>
+                                  <a:ea typeface="Cambria Math" panose="02040503050406030204" pitchFamily="18" charset="0"/>
+                                </a:rPr>
+                                <m:t>𝜎</m:t>
+                              </m:r>
+                            </m:e>
+                            <m:sub>
+                              <m:r>
+                                <a:rPr lang="en-US" b="0" i="1" smtClean="0">
+                                  <a:latin typeface="Cambria Math" panose="02040503050406030204" pitchFamily="18" charset="0"/>
+                                </a:rPr>
+                                <m:t>𝑌</m:t>
+                              </m:r>
+                            </m:sub>
+                          </m:sSub>
+                        </m:den>
+                      </m:f>
+                      <m:nary>
+                        <m:naryPr>
+                          <m:chr m:val="∑"/>
+                          <m:ctrlPr>
+                            <a:rPr lang="en-US" b="0" i="1" smtClean="0">
+                              <a:latin typeface="Cambria Math" panose="02040503050406030204" pitchFamily="18" charset="0"/>
+                            </a:rPr>
+                          </m:ctrlPr>
+                        </m:naryPr>
+                        <m:sub>
+                          <m:r>
+                            <m:rPr>
+                              <m:brk m:alnAt="23"/>
+                            </m:rPr>
+                            <a:rPr lang="en-US" b="0" i="1" smtClean="0">
+                              <a:latin typeface="Cambria Math" panose="02040503050406030204" pitchFamily="18" charset="0"/>
+                            </a:rPr>
+                            <m:t>𝑚</m:t>
+                          </m:r>
+                          <m:r>
+                            <a:rPr lang="en-US" b="0" i="1" smtClean="0">
+                              <a:latin typeface="Cambria Math" panose="02040503050406030204" pitchFamily="18" charset="0"/>
+                            </a:rPr>
+                            <m:t>=</m:t>
+                          </m:r>
+                          <m:r>
+                            <m:rPr>
+                              <m:brk m:alnAt="23"/>
+                            </m:rPr>
+                            <a:rPr lang="en-US" b="0" i="1" smtClean="0">
+                              <a:latin typeface="Cambria Math" panose="02040503050406030204" pitchFamily="18" charset="0"/>
+                            </a:rPr>
+                            <m:t>0</m:t>
+                          </m:r>
+                        </m:sub>
+                        <m:sup>
+                          <m:r>
+                            <a:rPr lang="en-US" b="0" i="1" smtClean="0">
+                              <a:latin typeface="Cambria Math" panose="02040503050406030204" pitchFamily="18" charset="0"/>
+                            </a:rPr>
+                            <m:t>𝑀</m:t>
+                          </m:r>
+                          <m:r>
+                            <a:rPr lang="en-US" b="0" i="1" smtClean="0">
+                              <a:latin typeface="Cambria Math" panose="02040503050406030204" pitchFamily="18" charset="0"/>
+                            </a:rPr>
+                            <m:t>−</m:t>
+                          </m:r>
+                          <m:r>
+                            <a:rPr lang="en-US" b="0" i="1" smtClean="0">
+                              <a:latin typeface="Cambria Math" panose="02040503050406030204" pitchFamily="18" charset="0"/>
+                            </a:rPr>
+                            <m:t>1</m:t>
+                          </m:r>
+                        </m:sup>
+                        <m:e>
+                          <m:nary>
+                            <m:naryPr>
+                              <m:chr m:val="∑"/>
+                              <m:ctrlPr>
+                                <a:rPr lang="en-US" b="0" i="1" smtClean="0">
+                                  <a:latin typeface="Cambria Math" panose="02040503050406030204" pitchFamily="18" charset="0"/>
+                                </a:rPr>
+                              </m:ctrlPr>
+                            </m:naryPr>
+                            <m:sub>
+                              <m:r>
+                                <m:rPr>
+                                  <m:brk m:alnAt="23"/>
+                                </m:rPr>
+                                <a:rPr lang="en-US" b="0" i="1" smtClean="0">
+                                  <a:latin typeface="Cambria Math" panose="02040503050406030204" pitchFamily="18" charset="0"/>
+                                </a:rPr>
+                                <m:t>𝑛</m:t>
+                              </m:r>
+                              <m:r>
+                                <a:rPr lang="en-US" b="0" i="1" smtClean="0">
+                                  <a:latin typeface="Cambria Math" panose="02040503050406030204" pitchFamily="18" charset="0"/>
+                                </a:rPr>
+                                <m:t>=</m:t>
+                              </m:r>
+                              <m:r>
+                                <m:rPr>
+                                  <m:brk m:alnAt="23"/>
+                                </m:rPr>
+                                <a:rPr lang="en-US" b="0" i="1" smtClean="0">
+                                  <a:latin typeface="Cambria Math" panose="02040503050406030204" pitchFamily="18" charset="0"/>
+                                </a:rPr>
+                                <m:t>0</m:t>
+                              </m:r>
+                            </m:sub>
+                            <m:sup>
+                              <m:r>
+                                <a:rPr lang="en-US" b="0" i="1" smtClean="0">
+                                  <a:latin typeface="Cambria Math" panose="02040503050406030204" pitchFamily="18" charset="0"/>
+                                </a:rPr>
+                                <m:t>𝑁</m:t>
+                              </m:r>
+                              <m:r>
+                                <a:rPr lang="en-US" b="0" i="1" smtClean="0">
+                                  <a:latin typeface="Cambria Math" panose="02040503050406030204" pitchFamily="18" charset="0"/>
+                                </a:rPr>
+                                <m:t>−</m:t>
+                              </m:r>
+                              <m:r>
+                                <a:rPr lang="en-US" b="0" i="1" smtClean="0">
+                                  <a:latin typeface="Cambria Math" panose="02040503050406030204" pitchFamily="18" charset="0"/>
+                                </a:rPr>
+                                <m:t>1</m:t>
+                              </m:r>
+                            </m:sup>
+                            <m:e>
+                              <m:r>
+                                <a:rPr lang="en-US" b="0" i="1" smtClean="0">
+                                  <a:latin typeface="Cambria Math" panose="02040503050406030204" pitchFamily="18" charset="0"/>
+                                </a:rPr>
+                                <m:t>𝑋</m:t>
+                              </m:r>
+                              <m:d>
+                                <m:dPr>
+                                  <m:begChr m:val="["/>
+                                  <m:endChr m:val="]"/>
+                                  <m:ctrlPr>
+                                    <a:rPr lang="en-US" b="0" i="1" smtClean="0">
+                                      <a:latin typeface="Cambria Math" panose="02040503050406030204" pitchFamily="18" charset="0"/>
+                                    </a:rPr>
+                                  </m:ctrlPr>
+                                </m:dPr>
+                                <m:e>
+                                  <m:r>
+                                    <a:rPr lang="en-US" b="0" i="1" smtClean="0">
+                                      <a:latin typeface="Cambria Math" panose="02040503050406030204" pitchFamily="18" charset="0"/>
+                                    </a:rPr>
+                                    <m:t>𝑚</m:t>
+                                  </m:r>
+                                  <m:r>
+                                    <a:rPr lang="en-US" b="0" i="1" smtClean="0">
+                                      <a:latin typeface="Cambria Math" panose="02040503050406030204" pitchFamily="18" charset="0"/>
+                                    </a:rPr>
+                                    <m:t>,</m:t>
+                                  </m:r>
+                                  <m:r>
+                                    <a:rPr lang="en-US" b="0" i="1" smtClean="0">
+                                      <a:latin typeface="Cambria Math" panose="02040503050406030204" pitchFamily="18" charset="0"/>
+                                    </a:rPr>
+                                    <m:t>𝑛</m:t>
+                                  </m:r>
+                                </m:e>
+                              </m:d>
+                              <m:r>
+                                <a:rPr lang="en-US" b="0" i="1" smtClean="0">
+                                  <a:latin typeface="Cambria Math" panose="02040503050406030204" pitchFamily="18" charset="0"/>
+                                </a:rPr>
+                                <m:t>𝑌</m:t>
+                              </m:r>
+                              <m:r>
+                                <a:rPr lang="en-US" b="0" i="1" smtClean="0">
+                                  <a:latin typeface="Cambria Math" panose="02040503050406030204" pitchFamily="18" charset="0"/>
+                                </a:rPr>
+                                <m:t>[</m:t>
+                              </m:r>
+                              <m:r>
+                                <a:rPr lang="en-US" b="0" i="1" smtClean="0">
+                                  <a:latin typeface="Cambria Math" panose="02040503050406030204" pitchFamily="18" charset="0"/>
+                                </a:rPr>
+                                <m:t>𝑘</m:t>
+                              </m:r>
+                              <m:r>
+                                <a:rPr lang="en-US" b="0" i="1" smtClean="0">
+                                  <a:latin typeface="Cambria Math" panose="02040503050406030204" pitchFamily="18" charset="0"/>
+                                </a:rPr>
+                                <m:t>+</m:t>
+                              </m:r>
+                              <m:r>
+                                <a:rPr lang="en-US" b="0" i="1" smtClean="0">
+                                  <a:latin typeface="Cambria Math" panose="02040503050406030204" pitchFamily="18" charset="0"/>
+                                </a:rPr>
+                                <m:t>𝑚</m:t>
+                              </m:r>
+                              <m:r>
+                                <a:rPr lang="en-US" b="0" i="1" smtClean="0">
+                                  <a:latin typeface="Cambria Math" panose="02040503050406030204" pitchFamily="18" charset="0"/>
+                                </a:rPr>
+                                <m:t>,</m:t>
+                              </m:r>
+                              <m:r>
+                                <a:rPr lang="en-US" b="0" i="1" smtClean="0">
+                                  <a:latin typeface="Cambria Math" panose="02040503050406030204" pitchFamily="18" charset="0"/>
+                                </a:rPr>
+                                <m:t>𝑙</m:t>
+                              </m:r>
+                              <m:r>
+                                <a:rPr lang="en-US" b="0" i="1" smtClean="0">
+                                  <a:latin typeface="Cambria Math" panose="02040503050406030204" pitchFamily="18" charset="0"/>
+                                </a:rPr>
+                                <m:t>+</m:t>
+                              </m:r>
+                              <m:r>
+                                <a:rPr lang="en-US" b="0" i="1" smtClean="0">
+                                  <a:latin typeface="Cambria Math" panose="02040503050406030204" pitchFamily="18" charset="0"/>
+                                </a:rPr>
+                                <m:t>𝑛</m:t>
+                              </m:r>
+                              <m:r>
+                                <a:rPr lang="en-US" b="0" i="1" smtClean="0">
+                                  <a:latin typeface="Cambria Math" panose="02040503050406030204" pitchFamily="18" charset="0"/>
+                                </a:rPr>
+                                <m:t>]</m:t>
+                              </m:r>
+                            </m:e>
+                          </m:nary>
+                        </m:e>
+                      </m:nary>
+                    </m:oMath>
+                  </m:oMathPara>
+                </a14:m>
+                <a:endParaRPr lang="en-US" dirty="0"/>
+              </a:p>
+              <a:p>
+                <a:r>
+                  <a:rPr lang="en-US" dirty="0"/>
+                  <a:t>Works as follows: </a:t>
+                </a:r>
+              </a:p>
+              <a:p>
+                <a:pPr lvl="1"/>
+                <a:r>
+                  <a:rPr lang="en-US" dirty="0"/>
+                  <a:t>Find maximum correlation between a label image and all sources estimation images.</a:t>
+                </a:r>
+              </a:p>
+              <a:p>
+                <a:pPr lvl="1"/>
+                <a:r>
+                  <a:rPr lang="en-US" dirty="0"/>
+                  <a:t>Proceed to the next label, source estimation images group is decremented.</a:t>
+                </a:r>
+              </a:p>
+              <a:p>
+                <a:pPr lvl="1"/>
+                <a:r>
+                  <a:rPr lang="en-US" dirty="0"/>
+                  <a:t>Stop when all labels are covered and matched.</a:t>
+                </a:r>
+              </a:p>
+            </p:txBody>
+          </p:sp>
+        </mc:Choice>
+        <mc:Fallback>
+          <p:sp>
+            <p:nvSpPr>
+              <p:cNvPr id="3" name="Content Placeholder 2">
+                <a:extLst>
+                  <a:ext uri="{FF2B5EF4-FFF2-40B4-BE49-F238E27FC236}">
+                    <a16:creationId xmlns:a16="http://schemas.microsoft.com/office/drawing/2014/main" id="{C0565C77-94DE-4CBF-9792-C08EB5C2779C}"/>
+                  </a:ext>
+                </a:extLst>
+              </p:cNvPr>
+              <p:cNvSpPr>
+                <a:spLocks noGrp="1" noRot="1" noChangeAspect="1" noMove="1" noResize="1" noEditPoints="1" noAdjustHandles="1" noChangeArrowheads="1" noChangeShapeType="1" noTextEdit="1"/>
+              </p:cNvSpPr>
+              <p:nvPr>
+                <p:ph idx="1"/>
+              </p:nvPr>
+            </p:nvSpPr>
+            <p:spPr>
+              <a:blipFill>
+                <a:blip r:embed="rId2"/>
+                <a:stretch>
+                  <a:fillRect l="-1043" t="-2241"/>
+                </a:stretch>
+              </a:blipFill>
+            </p:spPr>
+            <p:txBody>
+              <a:bodyPr/>
+              <a:lstStyle/>
+              <a:p>
+                <a:r>
+                  <a:rPr lang="en-US">
+                    <a:noFill/>
+                  </a:rPr>
+                  <a:t> </a:t>
+                </a:r>
+              </a:p>
+            </p:txBody>
+          </p:sp>
+        </mc:Fallback>
+      </mc:AlternateContent>
+    </p:spTree>
+    <p:extLst>
+      <p:ext uri="{BB962C8B-B14F-4D97-AF65-F5344CB8AC3E}">
+        <p14:creationId xmlns:p14="http://schemas.microsoft.com/office/powerpoint/2010/main" val="3419767148"/>
+      </p:ext>
+    </p:extLst>
+  </p:cSld>
+  <p:clrMapOvr>
+    <a:masterClrMapping/>
+  </p:clrMapOvr>
 </p:sld>
 </file>
 
@@ -3698,6 +3919,136 @@
       </p:grpSpPr>
       <p:sp>
         <p:nvSpPr>
+          <p:cNvPr id="2" name="Title 1">
+            <a:extLst>
+              <a:ext uri="{FF2B5EF4-FFF2-40B4-BE49-F238E27FC236}">
+                <a16:creationId xmlns:a16="http://schemas.microsoft.com/office/drawing/2014/main" id="{BBDC79B8-D553-488C-8664-9F6EE5D04BF8}"/>
+              </a:ext>
+            </a:extLst>
+          </p:cNvPr>
+          <p:cNvSpPr>
+            <a:spLocks noGrp="1"/>
+          </p:cNvSpPr>
+          <p:nvPr>
+            <p:ph type="title"/>
+          </p:nvPr>
+        </p:nvSpPr>
+        <p:spPr/>
+        <p:txBody>
+          <a:bodyPr/>
+          <a:lstStyle/>
+          <a:p>
+            <a:pPr algn="ctr"/>
+            <a:r>
+              <a:rPr lang="en-US" dirty="0"/>
+              <a:t>ICA Performance Demonstration</a:t>
+            </a:r>
+          </a:p>
+        </p:txBody>
+      </p:sp>
+      <p:pic>
+        <p:nvPicPr>
+          <p:cNvPr id="5" name="Content Placeholder 4">
+            <a:extLst>
+              <a:ext uri="{FF2B5EF4-FFF2-40B4-BE49-F238E27FC236}">
+                <a16:creationId xmlns:a16="http://schemas.microsoft.com/office/drawing/2014/main" id="{62AD8772-7E6E-4E5B-AD46-788960D8D22A}"/>
+              </a:ext>
+            </a:extLst>
+          </p:cNvPr>
+          <p:cNvPicPr>
+            <a:picLocks noGrp="1" noChangeAspect="1"/>
+          </p:cNvPicPr>
+          <p:nvPr>
+            <p:ph idx="1"/>
+          </p:nvPr>
+        </p:nvPicPr>
+        <p:blipFill>
+          <a:blip r:embed="rId2">
+            <a:extLst>
+              <a:ext uri="{28A0092B-C50C-407E-A947-70E740481C1C}">
+                <a14:useLocalDpi xmlns:a14="http://schemas.microsoft.com/office/drawing/2010/main" val="0"/>
+              </a:ext>
+            </a:extLst>
+          </a:blip>
+          <a:stretch>
+            <a:fillRect/>
+          </a:stretch>
+        </p:blipFill>
+        <p:spPr>
+          <a:xfrm>
+            <a:off x="994793" y="1881764"/>
+            <a:ext cx="4611011" cy="3452689"/>
+          </a:xfrm>
+        </p:spPr>
+      </p:pic>
+      <p:pic>
+        <p:nvPicPr>
+          <p:cNvPr id="7" name="Picture 6">
+            <a:extLst>
+              <a:ext uri="{FF2B5EF4-FFF2-40B4-BE49-F238E27FC236}">
+                <a16:creationId xmlns:a16="http://schemas.microsoft.com/office/drawing/2014/main" id="{317551FE-0CA9-43AA-AFAB-0D84C933CB5F}"/>
+              </a:ext>
+            </a:extLst>
+          </p:cNvPr>
+          <p:cNvPicPr>
+            <a:picLocks noChangeAspect="1"/>
+          </p:cNvPicPr>
+          <p:nvPr/>
+        </p:nvPicPr>
+        <p:blipFill>
+          <a:blip r:embed="rId3">
+            <a:extLst>
+              <a:ext uri="{28A0092B-C50C-407E-A947-70E740481C1C}">
+                <a14:useLocalDpi xmlns:a14="http://schemas.microsoft.com/office/drawing/2010/main" val="0"/>
+              </a:ext>
+            </a:extLst>
+          </a:blip>
+          <a:stretch>
+            <a:fillRect/>
+          </a:stretch>
+        </p:blipFill>
+        <p:spPr>
+          <a:xfrm>
+            <a:off x="6174556" y="1881764"/>
+            <a:ext cx="4611011" cy="3452690"/>
+          </a:xfrm>
+          <a:prstGeom prst="rect">
+            <a:avLst/>
+          </a:prstGeom>
+        </p:spPr>
+      </p:pic>
+    </p:spTree>
+    <p:extLst>
+      <p:ext uri="{BB962C8B-B14F-4D97-AF65-F5344CB8AC3E}">
+        <p14:creationId xmlns:p14="http://schemas.microsoft.com/office/powerpoint/2010/main" val="3996225762"/>
+      </p:ext>
+    </p:extLst>
+  </p:cSld>
+  <p:clrMapOvr>
+    <a:masterClrMapping/>
+  </p:clrMapOvr>
+</p:sld>
+</file>
+
+<file path=ppt/slides/slide13.xml><?xml version="1.0" encoding="utf-8"?>
+<p:sld xmlns:a="http://schemas.openxmlformats.org/drawingml/2006/main" xmlns:r="http://schemas.openxmlformats.org/officeDocument/2006/relationships" xmlns:p="http://schemas.openxmlformats.org/presentationml/2006/main">
+  <p:cSld>
+    <p:spTree>
+      <p:nvGrpSpPr>
+        <p:cNvPr id="1" name=""/>
+        <p:cNvGrpSpPr/>
+        <p:nvPr/>
+      </p:nvGrpSpPr>
+      <p:grpSpPr>
+        <a:xfrm>
+          <a:off x="0" y="0"/>
+          <a:ext cx="0" cy="0"/>
+          <a:chOff x="0" y="0"/>
+          <a:chExt cx="0" cy="0"/>
+        </a:xfrm>
+      </p:grpSpPr>
+      <p:sp>
+        <p:nvSpPr>
           <p:cNvPr id="2" name="Title 1"/>
           <p:cNvSpPr>
             <a:spLocks noGrp="1"/>
@@ -3792,7 +4143,7 @@
 </p:sld>
 </file>
 
-<file path=ppt/slides/slide13.xml><?xml version="1.0" encoding="utf-8"?>
+<file path=ppt/slides/slide14.xml><?xml version="1.0" encoding="utf-8"?>
 <p:sld xmlns:a="http://schemas.openxmlformats.org/drawingml/2006/main" xmlns:r="http://schemas.openxmlformats.org/officeDocument/2006/relationships" xmlns:p="http://schemas.openxmlformats.org/presentationml/2006/main">
   <p:cSld>
     <p:spTree>
@@ -4011,14 +4362,6 @@
   <p:clrMapOvr>
     <a:masterClrMapping/>
   </p:clrMapOvr>
-  <mc:AlternateContent xmlns:mc="http://schemas.openxmlformats.org/markup-compatibility/2006" xmlns:p14="http://schemas.microsoft.com/office/powerpoint/2010/main">
-    <mc:Choice Requires="p14">
-      <p:transition spd="slow" p14:dur="2000"/>
-    </mc:Choice>
-    <mc:Fallback xmlns="">
-      <p:transition spd="slow"/>
-    </mc:Fallback>
-  </mc:AlternateContent>
 </p:sld>
 </file>
 
@@ -4120,19 +4463,11 @@
   <p:clrMapOvr>
     <a:masterClrMapping/>
   </p:clrMapOvr>
-  <mc:AlternateContent xmlns:mc="http://schemas.openxmlformats.org/markup-compatibility/2006" xmlns:p14="http://schemas.microsoft.com/office/powerpoint/2010/main">
-    <mc:Choice Requires="p14">
-      <p:transition spd="slow" p14:dur="2000"/>
-    </mc:Choice>
-    <mc:Fallback xmlns="">
-      <p:transition spd="slow"/>
-    </mc:Fallback>
-  </mc:AlternateContent>
 </p:sld>
 </file>
 
 <file path=ppt/slides/slide4.xml><?xml version="1.0" encoding="utf-8"?>
-<p:sld xmlns:a="http://schemas.openxmlformats.org/drawingml/2006/main" xmlns:r="http://schemas.openxmlformats.org/officeDocument/2006/relationships" xmlns:p="http://schemas.openxmlformats.org/presentationml/2006/main">
+<p:sld xmlns:a="http://schemas.openxmlformats.org/drawingml/2006/main" xmlns:r="http://schemas.openxmlformats.org/officeDocument/2006/relationships" xmlns:p="http://schemas.openxmlformats.org/presentationml/2006/main" show="0">
   <p:cSld>
     <p:spTree>
       <p:nvGrpSpPr>
@@ -4183,20 +4518,19 @@
           <a:lstStyle/>
           <a:p>
             <a:r>
-              <a:rPr lang="en-US" dirty="0" smtClean="0"/>
+              <a:rPr lang="en-US" dirty="0"/>
               <a:t>Diagram</a:t>
             </a:r>
-            <a:endParaRPr lang="en-US" dirty="0"/>
-          </a:p>
-          <a:p>
-            <a:r>
-              <a:rPr lang="en-US" dirty="0" smtClean="0"/>
+          </a:p>
+          <a:p>
+            <a:r>
+              <a:rPr lang="en-US" dirty="0"/>
               <a:t>Criterion</a:t>
             </a:r>
           </a:p>
           <a:p>
             <a:r>
-              <a:rPr lang="en-US" dirty="0" smtClean="0"/>
+              <a:rPr lang="en-US" dirty="0"/>
               <a:t>Equations</a:t>
             </a:r>
           </a:p>
@@ -4208,18 +4542,13 @@
           </a:p>
           <a:p>
             <a:r>
-              <a:rPr lang="en-US" dirty="0" smtClean="0"/>
-              <a:t>ICA with Max Sources – </a:t>
-            </a:r>
-            <a:r>
-              <a:rPr lang="en-US" dirty="0" smtClean="0"/>
-              <a:t>explain</a:t>
-            </a:r>
-            <a:endParaRPr lang="en-US" dirty="0" smtClean="0"/>
-          </a:p>
-          <a:p>
-            <a:r>
-              <a:rPr lang="en-US" dirty="0" smtClean="0"/>
+              <a:rPr lang="en-US" dirty="0"/>
+              <a:t>ICA with Max Sources – explain</a:t>
+            </a:r>
+          </a:p>
+          <a:p>
+            <a:r>
+              <a:rPr lang="en-US" dirty="0"/>
               <a:t>Plot ICA performance (2 plots)</a:t>
             </a:r>
           </a:p>
@@ -4235,13 +4564,6 @@
   <p:clrMapOvr>
     <a:masterClrMapping/>
   </p:clrMapOvr>
-  <p:timing>
-    <p:tnLst>
-      <p:par>
-        <p:cTn id="1" dur="indefinite" restart="never" nodeType="tmRoot"/>
-      </p:par>
-    </p:tnLst>
-  </p:timing>
 </p:sld>
 </file>
 
@@ -4296,18 +4618,11 @@
   <p:clrMapOvr>
     <a:masterClrMapping/>
   </p:clrMapOvr>
-  <p:timing>
-    <p:tnLst>
-      <p:par>
-        <p:cTn id="1" dur="indefinite" restart="never" nodeType="tmRoot"/>
-      </p:par>
-    </p:tnLst>
-  </p:timing>
 </p:sld>
 </file>
 
 <file path=ppt/slides/slide6.xml><?xml version="1.0" encoding="utf-8"?>
-<p:sld xmlns:a="http://schemas.openxmlformats.org/drawingml/2006/main" xmlns:r="http://schemas.openxmlformats.org/officeDocument/2006/relationships" xmlns:p="http://schemas.openxmlformats.org/presentationml/2006/main">
+<p:sld xmlns:a="http://schemas.openxmlformats.org/drawingml/2006/main" xmlns:r="http://schemas.openxmlformats.org/officeDocument/2006/relationships" xmlns:p="http://schemas.openxmlformats.org/presentationml/2006/main" show="0">
   <p:cSld>
     <p:spTree>
       <p:nvGrpSpPr>
@@ -4325,7 +4640,13 @@
       </p:grpSpPr>
       <p:sp>
         <p:nvSpPr>
-          <p:cNvPr id="2" name="Title 1"/>
+          <p:cNvPr id="2" name="Title 1">
+            <a:extLst>
+              <a:ext uri="{FF2B5EF4-FFF2-40B4-BE49-F238E27FC236}">
+                <a16:creationId xmlns:a16="http://schemas.microsoft.com/office/drawing/2014/main" id="{93647502-2109-430F-AC0F-43EBFF400139}"/>
+              </a:ext>
+            </a:extLst>
+          </p:cNvPr>
           <p:cNvSpPr>
             <a:spLocks noGrp="1"/>
           </p:cNvSpPr>
@@ -4338,13 +4659,22 @@
           <a:bodyPr/>
           <a:lstStyle/>
           <a:p>
-            <a:endParaRPr lang="en-US"/>
-          </a:p>
-        </p:txBody>
-      </p:sp>
-      <p:sp>
-        <p:nvSpPr>
-          <p:cNvPr id="3" name="Content Placeholder 2"/>
+            <a:r>
+              <a:rPr lang="en-US" dirty="0"/>
+              <a:t>Hardships</a:t>
+            </a:r>
+          </a:p>
+        </p:txBody>
+      </p:sp>
+      <p:sp>
+        <p:nvSpPr>
+          <p:cNvPr id="3" name="Content Placeholder 2">
+            <a:extLst>
+              <a:ext uri="{FF2B5EF4-FFF2-40B4-BE49-F238E27FC236}">
+                <a16:creationId xmlns:a16="http://schemas.microsoft.com/office/drawing/2014/main" id="{9244CF7D-F88A-4B87-B675-E2541C48F537}"/>
+              </a:ext>
+            </a:extLst>
+          </p:cNvPr>
           <p:cNvSpPr>
             <a:spLocks noGrp="1"/>
           </p:cNvSpPr>
@@ -4354,30 +4684,67 @@
         </p:nvSpPr>
         <p:spPr/>
         <p:txBody>
-          <a:bodyPr/>
-          <a:lstStyle/>
-          <a:p>
-            <a:endParaRPr lang="en-US"/>
+          <a:bodyPr>
+            <a:normAutofit lnSpcReduction="10000"/>
+          </a:bodyPr>
+          <a:lstStyle/>
+          <a:p>
+            <a:r>
+              <a:rPr lang="en-US" dirty="0"/>
+              <a:t>Finding a criterion for “success”</a:t>
+            </a:r>
+          </a:p>
+          <a:p>
+            <a:endParaRPr lang="en-US" dirty="0"/>
+          </a:p>
+          <a:p>
+            <a:r>
+              <a:rPr lang="en-US" dirty="0"/>
+              <a:t>Determining the input features and labels </a:t>
+            </a:r>
+          </a:p>
+          <a:p>
+            <a:endParaRPr lang="en-US" dirty="0"/>
+          </a:p>
+          <a:p>
+            <a:r>
+              <a:rPr lang="en-US" dirty="0"/>
+              <a:t>High-dimensional data</a:t>
+            </a:r>
+          </a:p>
+          <a:p>
+            <a:endParaRPr lang="en-US" dirty="0"/>
+          </a:p>
+          <a:p>
+            <a:r>
+              <a:rPr lang="en-US" dirty="0"/>
+              <a:t>Data pre-processing</a:t>
+            </a:r>
+          </a:p>
+          <a:p>
+            <a:endParaRPr lang="en-US" dirty="0"/>
+          </a:p>
+          <a:p>
+            <a:r>
+              <a:rPr lang="en-US" dirty="0"/>
+              <a:t>Tensor dimensions</a:t>
+            </a:r>
+          </a:p>
+          <a:p>
+            <a:endParaRPr lang="en-US" dirty="0"/>
           </a:p>
         </p:txBody>
       </p:sp>
     </p:spTree>
     <p:extLst>
       <p:ext uri="{BB962C8B-B14F-4D97-AF65-F5344CB8AC3E}">
-        <p14:creationId xmlns:p14="http://schemas.microsoft.com/office/powerpoint/2010/main" val="964336865"/>
+        <p14:creationId xmlns:p14="http://schemas.microsoft.com/office/powerpoint/2010/main" val="46179514"/>
       </p:ext>
     </p:extLst>
   </p:cSld>
   <p:clrMapOvr>
     <a:masterClrMapping/>
   </p:clrMapOvr>
-  <p:timing>
-    <p:tnLst>
-      <p:par>
-        <p:cTn id="1" dur="indefinite" restart="never" nodeType="tmRoot"/>
-      </p:par>
-    </p:tnLst>
-  </p:timing>
 </p:sld>
 </file>
 
@@ -4400,13 +4767,7 @@
       </p:grpSpPr>
       <p:sp>
         <p:nvSpPr>
-          <p:cNvPr id="2" name="Title 1">
-            <a:extLst>
-              <a:ext uri="{FF2B5EF4-FFF2-40B4-BE49-F238E27FC236}">
-                <a16:creationId xmlns:a16="http://schemas.microsoft.com/office/drawing/2014/main" id="{93647502-2109-430F-AC0F-43EBFF400139}"/>
-              </a:ext>
-            </a:extLst>
-          </p:cNvPr>
+          <p:cNvPr id="2" name="Title 1"/>
           <p:cNvSpPr>
             <a:spLocks noGrp="1"/>
           </p:cNvSpPr>
@@ -4421,20 +4782,14 @@
           <a:p>
             <a:r>
               <a:rPr lang="en-US" dirty="0"/>
-              <a:t>Hardships</a:t>
-            </a:r>
-          </a:p>
-        </p:txBody>
-      </p:sp>
-      <p:sp>
-        <p:nvSpPr>
-          <p:cNvPr id="3" name="Content Placeholder 2">
-            <a:extLst>
-              <a:ext uri="{FF2B5EF4-FFF2-40B4-BE49-F238E27FC236}">
-                <a16:creationId xmlns:a16="http://schemas.microsoft.com/office/drawing/2014/main" id="{9244CF7D-F88A-4B87-B675-E2541C48F537}"/>
-              </a:ext>
-            </a:extLst>
-          </p:cNvPr>
+              <a:t>Projects Objectives</a:t>
+            </a:r>
+          </a:p>
+        </p:txBody>
+      </p:sp>
+      <p:sp>
+        <p:nvSpPr>
+          <p:cNvPr id="3" name="Content Placeholder 2"/>
           <p:cNvSpPr>
             <a:spLocks noGrp="1"/>
           </p:cNvSpPr>
@@ -4445,13 +4800,13 @@
         <p:spPr/>
         <p:txBody>
           <a:bodyPr>
-            <a:normAutofit lnSpcReduction="10000"/>
+            <a:normAutofit fontScale="92500"/>
           </a:bodyPr>
           <a:lstStyle/>
           <a:p>
             <a:r>
               <a:rPr lang="en-US" dirty="0"/>
-              <a:t>Finding a criterion for “success”</a:t>
+              <a:t>Check existing approaches to BSS (Blind Source Separation) </a:t>
             </a:r>
           </a:p>
           <a:p>
@@ -4460,7 +4815,7 @@
           <a:p>
             <a:r>
               <a:rPr lang="en-US" dirty="0"/>
-              <a:t>Determining the input features and labels </a:t>
+              <a:t>Recruit Tetrapod engineered PSF properties to improve results</a:t>
             </a:r>
           </a:p>
           <a:p>
@@ -4469,7 +4824,7 @@
           <a:p>
             <a:r>
               <a:rPr lang="en-US" dirty="0"/>
-              <a:t>High-dimensional data</a:t>
+              <a:t>Adjust and Execute ICA (BSS method) and quantify it’s performance</a:t>
             </a:r>
           </a:p>
           <a:p>
@@ -4478,7 +4833,7 @@
           <a:p>
             <a:r>
               <a:rPr lang="en-US" dirty="0"/>
-              <a:t>Data pre-processing</a:t>
+              <a:t>Implement and execute a NN (Neural Net) and get better performance</a:t>
             </a:r>
           </a:p>
           <a:p>
@@ -4487,31 +4842,21 @@
           <a:p>
             <a:r>
               <a:rPr lang="en-US" dirty="0"/>
-              <a:t>Tensor dimensions</a:t>
-            </a:r>
-          </a:p>
-          <a:p>
-            <a:endParaRPr lang="en-US" dirty="0"/>
+              <a:t>Try different architectures of NN and compare results</a:t>
+            </a:r>
           </a:p>
         </p:txBody>
       </p:sp>
     </p:spTree>
     <p:extLst>
       <p:ext uri="{BB962C8B-B14F-4D97-AF65-F5344CB8AC3E}">
-        <p14:creationId xmlns:p14="http://schemas.microsoft.com/office/powerpoint/2010/main" val="46179514"/>
+        <p14:creationId xmlns:p14="http://schemas.microsoft.com/office/powerpoint/2010/main" val="3878798077"/>
       </p:ext>
     </p:extLst>
   </p:cSld>
   <p:clrMapOvr>
     <a:masterClrMapping/>
   </p:clrMapOvr>
-  <p:timing>
-    <p:tnLst>
-      <p:par>
-        <p:cTn id="1" dur="indefinite" restart="never" nodeType="tmRoot"/>
-      </p:par>
-    </p:tnLst>
-  </p:timing>
 </p:sld>
 </file>
 
@@ -4549,7 +4894,7 @@
           <a:p>
             <a:r>
               <a:rPr lang="en-US" dirty="0"/>
-              <a:t>Projects Objectives</a:t>
+              <a:t>Project Flow</a:t>
             </a:r>
           </a:p>
         </p:txBody>
@@ -4566,14 +4911,20 @@
         </p:nvSpPr>
         <p:spPr/>
         <p:txBody>
-          <a:bodyPr>
-            <a:normAutofit fontScale="92500"/>
-          </a:bodyPr>
+          <a:bodyPr/>
           <a:lstStyle/>
           <a:p>
             <a:r>
               <a:rPr lang="en-US" dirty="0"/>
-              <a:t>Check existing approaches to BSS (Blind Source Separation) </a:t>
+              <a:t>Create simulated data using Prof. </a:t>
+            </a:r>
+            <a:r>
+              <a:rPr lang="en-US" dirty="0" err="1"/>
+              <a:t>Schechtman’s</a:t>
+            </a:r>
+            <a:r>
+              <a:rPr lang="en-US" dirty="0"/>
+              <a:t> Tetrapod simulator</a:t>
             </a:r>
           </a:p>
           <a:p>
@@ -4582,7 +4933,7 @@
           <a:p>
             <a:r>
               <a:rPr lang="en-US" dirty="0"/>
-              <a:t>Recruit Tetrapod engineered PSF properties to improve results</a:t>
+              <a:t>Run ICA under different conditions and observe results</a:t>
             </a:r>
           </a:p>
           <a:p>
@@ -4591,8 +4942,9 @@
           <a:p>
             <a:r>
               <a:rPr lang="en-US" dirty="0"/>
-              <a:t>Adjust and Execute ICA (BSS method) and quantify it’s performance</a:t>
-            </a:r>
+              <a:t>Simulate a BIG database for training, validating and testing the net  </a:t>
+            </a:r>
+            <a:endParaRPr lang="he-IL" dirty="0"/>
           </a:p>
           <a:p>
             <a:endParaRPr lang="en-US" dirty="0"/>
@@ -4600,24 +4952,19 @@
           <a:p>
             <a:r>
               <a:rPr lang="en-US" dirty="0"/>
-              <a:t>Implement and execute a NN (Neural Net) and get better performance</a:t>
-            </a:r>
+              <a:t>Implement and run NN and optimize architecture</a:t>
+            </a:r>
+            <a:endParaRPr lang="he-IL" dirty="0"/>
           </a:p>
           <a:p>
             <a:endParaRPr lang="en-US" dirty="0"/>
-          </a:p>
-          <a:p>
-            <a:r>
-              <a:rPr lang="en-US" dirty="0"/>
-              <a:t>Try different architectures of NN and compare results</a:t>
-            </a:r>
           </a:p>
         </p:txBody>
       </p:sp>
     </p:spTree>
     <p:extLst>
       <p:ext uri="{BB962C8B-B14F-4D97-AF65-F5344CB8AC3E}">
-        <p14:creationId xmlns:p14="http://schemas.microsoft.com/office/powerpoint/2010/main" val="3878798077"/>
+        <p14:creationId xmlns:p14="http://schemas.microsoft.com/office/powerpoint/2010/main" val="2564615523"/>
       </p:ext>
     </p:extLst>
   </p:cSld>
@@ -4661,7 +5008,7 @@
           <a:p>
             <a:r>
               <a:rPr lang="en-US" dirty="0"/>
-              <a:t>Project Flow</a:t>
+              <a:t>So far</a:t>
             </a:r>
           </a:p>
         </p:txBody>
@@ -4678,60 +5025,82 @@
         </p:nvSpPr>
         <p:spPr/>
         <p:txBody>
-          <a:bodyPr/>
+          <a:bodyPr>
+            <a:normAutofit/>
+          </a:bodyPr>
           <a:lstStyle/>
           <a:p>
             <a:r>
               <a:rPr lang="en-US" dirty="0"/>
-              <a:t>Create simulated data using Prof. </a:t>
-            </a:r>
-            <a:r>
-              <a:rPr lang="en-US" dirty="0" err="1"/>
-              <a:t>Schechtman’s</a:t>
-            </a:r>
+              <a:t>Simulating data using a Tetrapod simulator – </a:t>
+            </a:r>
+            <a:r>
+              <a:rPr lang="en-US" b="1" u="sng" dirty="0"/>
+              <a:t>done</a:t>
+            </a:r>
+          </a:p>
+          <a:p>
             <a:r>
               <a:rPr lang="en-US" dirty="0"/>
-              <a:t> Tetrapod simulator</a:t>
+              <a:t>For example:</a:t>
             </a:r>
           </a:p>
           <a:p>
             <a:endParaRPr lang="en-US" dirty="0"/>
           </a:p>
           <a:p>
-            <a:r>
-              <a:rPr lang="en-US" dirty="0"/>
-              <a:t>Run ICA under different conditions and observe results</a:t>
-            </a:r>
-          </a:p>
-          <a:p>
             <a:endParaRPr lang="en-US" dirty="0"/>
           </a:p>
           <a:p>
-            <a:r>
-              <a:rPr lang="en-US" dirty="0"/>
-              <a:t>Simulate a BIG database for training, validating and testing the net  </a:t>
-            </a:r>
-            <a:endParaRPr lang="he-IL" dirty="0"/>
-          </a:p>
-          <a:p>
             <a:endParaRPr lang="en-US" dirty="0"/>
           </a:p>
           <a:p>
-            <a:r>
-              <a:rPr lang="en-US" dirty="0"/>
-              <a:t>Implement and run NN and optimize architecture</a:t>
-            </a:r>
-            <a:endParaRPr lang="he-IL" dirty="0"/>
-          </a:p>
-          <a:p>
             <a:endParaRPr lang="en-US" dirty="0"/>
           </a:p>
         </p:txBody>
       </p:sp>
+      <p:pic>
+        <p:nvPicPr>
+          <p:cNvPr id="5" name="BlinkMov">
+            <a:hlinkClick r:id="" action="ppaction://media"/>
+            <a:extLst>
+              <a:ext uri="{FF2B5EF4-FFF2-40B4-BE49-F238E27FC236}">
+                <a16:creationId xmlns:a16="http://schemas.microsoft.com/office/drawing/2014/main" id="{8D471403-6D72-469A-9A84-25B555BDAFE3}"/>
+              </a:ext>
+            </a:extLst>
+          </p:cNvPr>
+          <p:cNvPicPr>
+            <a:picLocks noChangeAspect="1"/>
+          </p:cNvPicPr>
+          <p:nvPr>
+            <a:videoFile r:link="rId2"/>
+            <p:extLst>
+              <p:ext uri="{DAA4B4D4-6D71-4841-9C94-3DE7FCFB9230}">
+                <p14:media xmlns:p14="http://schemas.microsoft.com/office/powerpoint/2010/main" r:embed="rId1"/>
+              </p:ext>
+            </p:extLst>
+          </p:nvPr>
+        </p:nvPicPr>
+        <p:blipFill>
+          <a:blip r:embed="rId4"/>
+          <a:stretch>
+            <a:fillRect/>
+          </a:stretch>
+        </p:blipFill>
+        <p:spPr>
+          <a:xfrm>
+            <a:off x="4619134" y="3349023"/>
+            <a:ext cx="2757612" cy="2757612"/>
+          </a:xfrm>
+          <a:prstGeom prst="rect">
+            <a:avLst/>
+          </a:prstGeom>
+        </p:spPr>
+      </p:pic>
     </p:spTree>
     <p:extLst>
       <p:ext uri="{BB962C8B-B14F-4D97-AF65-F5344CB8AC3E}">
-        <p14:creationId xmlns:p14="http://schemas.microsoft.com/office/powerpoint/2010/main" val="2564615523"/>
+        <p14:creationId xmlns:p14="http://schemas.microsoft.com/office/powerpoint/2010/main" val="4062309665"/>
       </p:ext>
     </p:extLst>
   </p:cSld>
@@ -4741,7 +5110,135 @@
   <p:timing>
     <p:tnLst>
       <p:par>
-        <p:cTn id="1" dur="indefinite" restart="never" nodeType="tmRoot"/>
+        <p:cTn id="1" dur="indefinite" restart="never" nodeType="tmRoot">
+          <p:childTnLst>
+            <p:seq concurrent="1" nextAc="seek">
+              <p:cTn id="2" dur="indefinite" nodeType="mainSeq">
+                <p:childTnLst>
+                  <p:par>
+                    <p:cTn id="3" fill="hold">
+                      <p:stCondLst>
+                        <p:cond delay="indefinite"/>
+                      </p:stCondLst>
+                      <p:childTnLst>
+                        <p:par>
+                          <p:cTn id="4" fill="hold">
+                            <p:stCondLst>
+                              <p:cond delay="0"/>
+                            </p:stCondLst>
+                            <p:childTnLst>
+                              <p:par>
+                                <p:cTn id="5" presetID="1" presetClass="mediacall" presetSubtype="0" fill="hold" nodeType="clickEffect">
+                                  <p:stCondLst>
+                                    <p:cond delay="0"/>
+                                  </p:stCondLst>
+                                  <p:childTnLst>
+                                    <p:cmd type="call" cmd="playFrom(0.0)">
+                                      <p:cBhvr>
+                                        <p:cTn id="6" dur="1333" fill="hold"/>
+                                        <p:tgtEl>
+                                          <p:spTgt spid="5"/>
+                                        </p:tgtEl>
+                                      </p:cBhvr>
+                                    </p:cmd>
+                                  </p:childTnLst>
+                                </p:cTn>
+                              </p:par>
+                            </p:childTnLst>
+                          </p:cTn>
+                        </p:par>
+                      </p:childTnLst>
+                    </p:cTn>
+                  </p:par>
+                </p:childTnLst>
+              </p:cTn>
+              <p:prevCondLst>
+                <p:cond evt="onPrev" delay="0">
+                  <p:tgtEl>
+                    <p:sldTgt/>
+                  </p:tgtEl>
+                </p:cond>
+              </p:prevCondLst>
+              <p:nextCondLst>
+                <p:cond evt="onNext" delay="0">
+                  <p:tgtEl>
+                    <p:sldTgt/>
+                  </p:tgtEl>
+                </p:cond>
+              </p:nextCondLst>
+            </p:seq>
+            <p:video>
+              <p:cMediaNode vol="80000">
+                <p:cTn id="7" fill="hold" display="0">
+                  <p:stCondLst>
+                    <p:cond delay="indefinite"/>
+                  </p:stCondLst>
+                </p:cTn>
+                <p:tgtEl>
+                  <p:spTgt spid="5"/>
+                </p:tgtEl>
+              </p:cMediaNode>
+            </p:video>
+            <p:seq concurrent="1" nextAc="seek">
+              <p:cTn id="8" restart="whenNotActive" fill="hold" evtFilter="cancelBubble" nodeType="interactiveSeq">
+                <p:stCondLst>
+                  <p:cond evt="onClick" delay="0">
+                    <p:tgtEl>
+                      <p:spTgt spid="5"/>
+                    </p:tgtEl>
+                  </p:cond>
+                </p:stCondLst>
+                <p:endSync evt="end" delay="0">
+                  <p:rtn val="all"/>
+                </p:endSync>
+                <p:childTnLst>
+                  <p:par>
+                    <p:cTn id="9" fill="hold">
+                      <p:stCondLst>
+                        <p:cond delay="0"/>
+                      </p:stCondLst>
+                      <p:childTnLst>
+                        <p:par>
+                          <p:cTn id="10" fill="hold">
+                            <p:stCondLst>
+                              <p:cond delay="0"/>
+                            </p:stCondLst>
+                            <p:childTnLst>
+                              <p:par>
+                                <p:cTn id="11" presetID="2" presetClass="mediacall" presetSubtype="0" fill="hold" nodeType="clickEffect">
+                                  <p:stCondLst>
+                                    <p:cond delay="0"/>
+                                  </p:stCondLst>
+                                  <p:childTnLst>
+                                    <p:cmd type="call" cmd="togglePause">
+                                      <p:cBhvr>
+                                        <p:cTn id="12" dur="1" fill="hold"/>
+                                        <p:tgtEl>
+                                          <p:spTgt spid="5"/>
+                                        </p:tgtEl>
+                                      </p:cBhvr>
+                                    </p:cmd>
+                                  </p:childTnLst>
+                                </p:cTn>
+                              </p:par>
+                            </p:childTnLst>
+                          </p:cTn>
+                        </p:par>
+                      </p:childTnLst>
+                    </p:cTn>
+                  </p:par>
+                </p:childTnLst>
+              </p:cTn>
+              <p:nextCondLst>
+                <p:cond evt="onClick" delay="0">
+                  <p:tgtEl>
+                    <p:spTgt spid="5"/>
+                  </p:tgtEl>
+                </p:cond>
+              </p:nextCondLst>
+            </p:seq>
+          </p:childTnLst>
+        </p:cTn>
       </p:par>
     </p:tnLst>
   </p:timing>

</xml_diff>